<commit_message>
Added more illustrative slides.
</commit_message>
<xml_diff>
--- a/chapter3/lecture_3_illustrations.pptx
+++ b/chapter3/lecture_3_illustrations.pptx
@@ -10,6 +10,8 @@
     <p:sldId id="258" r:id="rId4"/>
     <p:sldId id="259" r:id="rId5"/>
     <p:sldId id="260" r:id="rId6"/>
+    <p:sldId id="261" r:id="rId7"/>
+    <p:sldId id="262" r:id="rId8"/>
   </p:sldIdLst>
   <p:sldSz cx="12192000" cy="6858000"/>
   <p:notesSz cx="6858000" cy="9144000"/>
@@ -265,7 +267,7 @@
           <a:p>
             <a:fld id="{BDB53D75-2BBE-924F-AF98-5D44231F7F45}" type="datetimeFigureOut">
               <a:rPr lang="en-US" smtClean="0"/>
-              <a:t>11/24/25</a:t>
+              <a:t>11/25/25</a:t>
             </a:fld>
             <a:endParaRPr lang="en-US"/>
           </a:p>
@@ -465,7 +467,7 @@
           <a:p>
             <a:fld id="{BDB53D75-2BBE-924F-AF98-5D44231F7F45}" type="datetimeFigureOut">
               <a:rPr lang="en-US" smtClean="0"/>
-              <a:t>11/24/25</a:t>
+              <a:t>11/25/25</a:t>
             </a:fld>
             <a:endParaRPr lang="en-US"/>
           </a:p>
@@ -675,7 +677,7 @@
           <a:p>
             <a:fld id="{BDB53D75-2BBE-924F-AF98-5D44231F7F45}" type="datetimeFigureOut">
               <a:rPr lang="en-US" smtClean="0"/>
-              <a:t>11/24/25</a:t>
+              <a:t>11/25/25</a:t>
             </a:fld>
             <a:endParaRPr lang="en-US"/>
           </a:p>
@@ -875,7 +877,7 @@
           <a:p>
             <a:fld id="{BDB53D75-2BBE-924F-AF98-5D44231F7F45}" type="datetimeFigureOut">
               <a:rPr lang="en-US" smtClean="0"/>
-              <a:t>11/24/25</a:t>
+              <a:t>11/25/25</a:t>
             </a:fld>
             <a:endParaRPr lang="en-US"/>
           </a:p>
@@ -1151,7 +1153,7 @@
           <a:p>
             <a:fld id="{BDB53D75-2BBE-924F-AF98-5D44231F7F45}" type="datetimeFigureOut">
               <a:rPr lang="en-US" smtClean="0"/>
-              <a:t>11/24/25</a:t>
+              <a:t>11/25/25</a:t>
             </a:fld>
             <a:endParaRPr lang="en-US"/>
           </a:p>
@@ -1419,7 +1421,7 @@
           <a:p>
             <a:fld id="{BDB53D75-2BBE-924F-AF98-5D44231F7F45}" type="datetimeFigureOut">
               <a:rPr lang="en-US" smtClean="0"/>
-              <a:t>11/24/25</a:t>
+              <a:t>11/25/25</a:t>
             </a:fld>
             <a:endParaRPr lang="en-US"/>
           </a:p>
@@ -1834,7 +1836,7 @@
           <a:p>
             <a:fld id="{BDB53D75-2BBE-924F-AF98-5D44231F7F45}" type="datetimeFigureOut">
               <a:rPr lang="en-US" smtClean="0"/>
-              <a:t>11/24/25</a:t>
+              <a:t>11/25/25</a:t>
             </a:fld>
             <a:endParaRPr lang="en-US"/>
           </a:p>
@@ -1976,7 +1978,7 @@
           <a:p>
             <a:fld id="{BDB53D75-2BBE-924F-AF98-5D44231F7F45}" type="datetimeFigureOut">
               <a:rPr lang="en-US" smtClean="0"/>
-              <a:t>11/24/25</a:t>
+              <a:t>11/25/25</a:t>
             </a:fld>
             <a:endParaRPr lang="en-US"/>
           </a:p>
@@ -2089,7 +2091,7 @@
           <a:p>
             <a:fld id="{BDB53D75-2BBE-924F-AF98-5D44231F7F45}" type="datetimeFigureOut">
               <a:rPr lang="en-US" smtClean="0"/>
-              <a:t>11/24/25</a:t>
+              <a:t>11/25/25</a:t>
             </a:fld>
             <a:endParaRPr lang="en-US"/>
           </a:p>
@@ -2402,7 +2404,7 @@
           <a:p>
             <a:fld id="{BDB53D75-2BBE-924F-AF98-5D44231F7F45}" type="datetimeFigureOut">
               <a:rPr lang="en-US" smtClean="0"/>
-              <a:t>11/24/25</a:t>
+              <a:t>11/25/25</a:t>
             </a:fld>
             <a:endParaRPr lang="en-US"/>
           </a:p>
@@ -2691,7 +2693,7 @@
           <a:p>
             <a:fld id="{BDB53D75-2BBE-924F-AF98-5D44231F7F45}" type="datetimeFigureOut">
               <a:rPr lang="en-US" smtClean="0"/>
-              <a:t>11/24/25</a:t>
+              <a:t>11/25/25</a:t>
             </a:fld>
             <a:endParaRPr lang="en-US"/>
           </a:p>
@@ -2934,7 +2936,7 @@
           <a:p>
             <a:fld id="{BDB53D75-2BBE-924F-AF98-5D44231F7F45}" type="datetimeFigureOut">
               <a:rPr lang="en-US" smtClean="0"/>
-              <a:t>11/24/25</a:t>
+              <a:t>11/25/25</a:t>
             </a:fld>
             <a:endParaRPr lang="en-US"/>
           </a:p>
@@ -6835,6 +6837,554 @@
     <p:extLst>
       <p:ext uri="{BB962C8B-B14F-4D97-AF65-F5344CB8AC3E}">
         <p14:creationId xmlns:p14="http://schemas.microsoft.com/office/powerpoint/2010/main" val="4109268090"/>
+      </p:ext>
+    </p:extLst>
+  </p:cSld>
+  <p:clrMapOvr>
+    <a:masterClrMapping/>
+  </p:clrMapOvr>
+</p:sld>
+</file>
+
+<file path=ppt/slides/slide6.xml><?xml version="1.0" encoding="utf-8"?>
+<p:sld xmlns:a="http://schemas.openxmlformats.org/drawingml/2006/main" xmlns:r="http://schemas.openxmlformats.org/officeDocument/2006/relationships" xmlns:p="http://schemas.openxmlformats.org/presentationml/2006/main">
+  <p:cSld>
+    <p:spTree>
+      <p:nvGrpSpPr>
+        <p:cNvPr id="1" name=""/>
+        <p:cNvGrpSpPr/>
+        <p:nvPr/>
+      </p:nvGrpSpPr>
+      <p:grpSpPr>
+        <a:xfrm>
+          <a:off x="0" y="0"/>
+          <a:ext cx="0" cy="0"/>
+          <a:chOff x="0" y="0"/>
+          <a:chExt cx="0" cy="0"/>
+        </a:xfrm>
+      </p:grpSpPr>
+      <p:sp>
+        <p:nvSpPr>
+          <p:cNvPr id="2" name="Title 1">
+            <a:extLst>
+              <a:ext uri="{FF2B5EF4-FFF2-40B4-BE49-F238E27FC236}">
+                <a16:creationId xmlns:a16="http://schemas.microsoft.com/office/drawing/2014/main" id="{2D0F4504-27CA-D823-9247-4E82CB971E2B}"/>
+              </a:ext>
+            </a:extLst>
+          </p:cNvPr>
+          <p:cNvSpPr>
+            <a:spLocks noGrp="1"/>
+          </p:cNvSpPr>
+          <p:nvPr>
+            <p:ph type="title"/>
+          </p:nvPr>
+        </p:nvSpPr>
+        <p:spPr>
+          <a:xfrm>
+            <a:off x="315686" y="176086"/>
+            <a:ext cx="11388634" cy="540039"/>
+          </a:xfrm>
+        </p:spPr>
+        <p:txBody>
+          <a:bodyPr>
+            <a:normAutofit fontScale="90000"/>
+          </a:bodyPr>
+          <a:lstStyle/>
+          <a:p>
+            <a:r>
+              <a:rPr lang="en-US" dirty="0"/>
+              <a:t>Form factor result, compared with hard sphere model</a:t>
+            </a:r>
+          </a:p>
+        </p:txBody>
+      </p:sp>
+      <p:sp>
+        <p:nvSpPr>
+          <p:cNvPr id="3" name="TextBox 2">
+            <a:extLst>
+              <a:ext uri="{FF2B5EF4-FFF2-40B4-BE49-F238E27FC236}">
+                <a16:creationId xmlns:a16="http://schemas.microsoft.com/office/drawing/2014/main" id="{61FCB543-7C75-A7C6-4ED6-21B6F99C082B}"/>
+              </a:ext>
+            </a:extLst>
+          </p:cNvPr>
+          <p:cNvSpPr txBox="1"/>
+          <p:nvPr/>
+        </p:nvSpPr>
+        <p:spPr>
+          <a:xfrm>
+            <a:off x="209268" y="2796395"/>
+            <a:ext cx="4140108" cy="646331"/>
+          </a:xfrm>
+          <a:prstGeom prst="rect">
+            <a:avLst/>
+          </a:prstGeom>
+          <a:noFill/>
+        </p:spPr>
+        <p:txBody>
+          <a:bodyPr wrap="none" rtlCol="0">
+            <a:spAutoFit/>
+          </a:bodyPr>
+          <a:lstStyle/>
+          <a:p>
+            <a:r>
+              <a:rPr lang="en-US" dirty="0"/>
+              <a:t>Assume the scattering nucleus is Xenon</a:t>
+            </a:r>
+          </a:p>
+          <a:p>
+            <a:r>
+              <a:rPr lang="en-US" dirty="0"/>
+              <a:t>at A=131, nuclear radius 6.1fm</a:t>
+            </a:r>
+          </a:p>
+        </p:txBody>
+      </p:sp>
+      <p:pic>
+        <p:nvPicPr>
+          <p:cNvPr id="4" name="Picture 3">
+            <a:extLst>
+              <a:ext uri="{FF2B5EF4-FFF2-40B4-BE49-F238E27FC236}">
+                <a16:creationId xmlns:a16="http://schemas.microsoft.com/office/drawing/2014/main" id="{FCFA7407-4EB8-E5E1-8178-16A360353767}"/>
+              </a:ext>
+            </a:extLst>
+          </p:cNvPr>
+          <p:cNvPicPr>
+            <a:picLocks noChangeAspect="1"/>
+          </p:cNvPicPr>
+          <p:nvPr/>
+        </p:nvPicPr>
+        <p:blipFill>
+          <a:blip r:embed="rId2"/>
+          <a:stretch>
+            <a:fillRect/>
+          </a:stretch>
+        </p:blipFill>
+        <p:spPr>
+          <a:xfrm>
+            <a:off x="377403" y="1483244"/>
+            <a:ext cx="4547650" cy="1196750"/>
+          </a:xfrm>
+          <a:prstGeom prst="rect">
+            <a:avLst/>
+          </a:prstGeom>
+        </p:spPr>
+      </p:pic>
+      <p:grpSp>
+        <p:nvGrpSpPr>
+          <p:cNvPr id="10" name="Group 9">
+            <a:extLst>
+              <a:ext uri="{FF2B5EF4-FFF2-40B4-BE49-F238E27FC236}">
+                <a16:creationId xmlns:a16="http://schemas.microsoft.com/office/drawing/2014/main" id="{04068922-A129-CFDE-4BC8-2310489BABDE}"/>
+              </a:ext>
+            </a:extLst>
+          </p:cNvPr>
+          <p:cNvGrpSpPr/>
+          <p:nvPr/>
+        </p:nvGrpSpPr>
+        <p:grpSpPr>
+          <a:xfrm>
+            <a:off x="377403" y="3559127"/>
+            <a:ext cx="2430316" cy="1494841"/>
+            <a:chOff x="315686" y="3561198"/>
+            <a:chExt cx="2430316" cy="1494841"/>
+          </a:xfrm>
+        </p:grpSpPr>
+        <p:pic>
+          <p:nvPicPr>
+            <p:cNvPr id="7" name="Picture 6">
+              <a:extLst>
+                <a:ext uri="{FF2B5EF4-FFF2-40B4-BE49-F238E27FC236}">
+                  <a16:creationId xmlns:a16="http://schemas.microsoft.com/office/drawing/2014/main" id="{F8E799FC-D16D-2C33-ADA5-2149A815D2C4}"/>
+                </a:ext>
+              </a:extLst>
+            </p:cNvPr>
+            <p:cNvPicPr>
+              <a:picLocks noChangeAspect="1"/>
+            </p:cNvPicPr>
+            <p:nvPr/>
+          </p:nvPicPr>
+          <p:blipFill>
+            <a:blip r:embed="rId3"/>
+            <a:stretch>
+              <a:fillRect/>
+            </a:stretch>
+          </p:blipFill>
+          <p:spPr>
+            <a:xfrm>
+              <a:off x="315686" y="3561198"/>
+              <a:ext cx="2430316" cy="344597"/>
+            </a:xfrm>
+            <a:prstGeom prst="rect">
+              <a:avLst/>
+            </a:prstGeom>
+          </p:spPr>
+        </p:pic>
+        <p:pic>
+          <p:nvPicPr>
+            <p:cNvPr id="8" name="Picture 7">
+              <a:extLst>
+                <a:ext uri="{FF2B5EF4-FFF2-40B4-BE49-F238E27FC236}">
+                  <a16:creationId xmlns:a16="http://schemas.microsoft.com/office/drawing/2014/main" id="{22A93393-684D-9BBF-5046-92E3B462E7AF}"/>
+                </a:ext>
+              </a:extLst>
+            </p:cNvPr>
+            <p:cNvPicPr>
+              <a:picLocks noChangeAspect="1"/>
+            </p:cNvPicPr>
+            <p:nvPr/>
+          </p:nvPicPr>
+          <p:blipFill>
+            <a:blip r:embed="rId4"/>
+            <a:stretch>
+              <a:fillRect/>
+            </a:stretch>
+          </p:blipFill>
+          <p:spPr>
+            <a:xfrm>
+              <a:off x="315686" y="4196434"/>
+              <a:ext cx="1595845" cy="267567"/>
+            </a:xfrm>
+            <a:prstGeom prst="rect">
+              <a:avLst/>
+            </a:prstGeom>
+          </p:spPr>
+        </p:pic>
+        <p:pic>
+          <p:nvPicPr>
+            <p:cNvPr id="9" name="Picture 8">
+              <a:extLst>
+                <a:ext uri="{FF2B5EF4-FFF2-40B4-BE49-F238E27FC236}">
+                  <a16:creationId xmlns:a16="http://schemas.microsoft.com/office/drawing/2014/main" id="{8686B95E-5130-54E7-66D4-50FA1912D5DF}"/>
+                </a:ext>
+              </a:extLst>
+            </p:cNvPr>
+            <p:cNvPicPr>
+              <a:picLocks noChangeAspect="1"/>
+            </p:cNvPicPr>
+            <p:nvPr/>
+          </p:nvPicPr>
+          <p:blipFill>
+            <a:blip r:embed="rId5"/>
+            <a:stretch>
+              <a:fillRect/>
+            </a:stretch>
+          </p:blipFill>
+          <p:spPr>
+            <a:xfrm>
+              <a:off x="315686" y="4784928"/>
+              <a:ext cx="2430316" cy="271111"/>
+            </a:xfrm>
+            <a:prstGeom prst="rect">
+              <a:avLst/>
+            </a:prstGeom>
+          </p:spPr>
+        </p:pic>
+      </p:grpSp>
+      <p:pic>
+        <p:nvPicPr>
+          <p:cNvPr id="1028" name="Picture 4">
+            <a:extLst>
+              <a:ext uri="{FF2B5EF4-FFF2-40B4-BE49-F238E27FC236}">
+                <a16:creationId xmlns:a16="http://schemas.microsoft.com/office/drawing/2014/main" id="{86479AFA-C925-F27D-5A0A-8F7B4B3AD1B0}"/>
+              </a:ext>
+            </a:extLst>
+          </p:cNvPr>
+          <p:cNvPicPr>
+            <a:picLocks noChangeAspect="1" noChangeArrowheads="1"/>
+          </p:cNvPicPr>
+          <p:nvPr/>
+        </p:nvPicPr>
+        <p:blipFill>
+          <a:blip r:embed="rId6">
+            <a:extLst>
+              <a:ext uri="{28A0092B-C50C-407E-A947-70E740481C1C}">
+                <a14:useLocalDpi xmlns:a14="http://schemas.microsoft.com/office/drawing/2010/main" val="0"/>
+              </a:ext>
+            </a:extLst>
+          </a:blip>
+          <a:srcRect/>
+          <a:stretch>
+            <a:fillRect/>
+          </a:stretch>
+        </p:blipFill>
+        <p:spPr bwMode="auto">
+          <a:xfrm>
+            <a:off x="5582919" y="729516"/>
+            <a:ext cx="5105400" cy="6096000"/>
+          </a:xfrm>
+          <a:prstGeom prst="rect">
+            <a:avLst/>
+          </a:prstGeom>
+          <a:noFill/>
+          <a:extLst>
+            <a:ext uri="{909E8E84-426E-40DD-AFC4-6F175D3DCCD1}">
+              <a14:hiddenFill xmlns:a14="http://schemas.microsoft.com/office/drawing/2010/main">
+                <a:solidFill>
+                  <a:srgbClr val="FFFFFF"/>
+                </a:solidFill>
+              </a14:hiddenFill>
+            </a:ext>
+          </a:extLst>
+        </p:spPr>
+      </p:pic>
+      <p:sp>
+        <p:nvSpPr>
+          <p:cNvPr id="11" name="TextBox 10">
+            <a:extLst>
+              <a:ext uri="{FF2B5EF4-FFF2-40B4-BE49-F238E27FC236}">
+                <a16:creationId xmlns:a16="http://schemas.microsoft.com/office/drawing/2014/main" id="{A6247C7A-0435-1D13-EA64-57614CE4EA75}"/>
+              </a:ext>
+            </a:extLst>
+          </p:cNvPr>
+          <p:cNvSpPr txBox="1"/>
+          <p:nvPr/>
+        </p:nvSpPr>
+        <p:spPr>
+          <a:xfrm>
+            <a:off x="209268" y="734883"/>
+            <a:ext cx="4752007" cy="646331"/>
+          </a:xfrm>
+          <a:prstGeom prst="rect">
+            <a:avLst/>
+          </a:prstGeom>
+          <a:noFill/>
+        </p:spPr>
+        <p:txBody>
+          <a:bodyPr wrap="none" rtlCol="0">
+            <a:spAutoFit/>
+          </a:bodyPr>
+          <a:lstStyle/>
+          <a:p>
+            <a:r>
+              <a:rPr lang="en-US" dirty="0"/>
+              <a:t>In the notes we calculated the form factor</a:t>
+            </a:r>
+          </a:p>
+          <a:p>
+            <a:r>
+              <a:rPr lang="en-US" dirty="0"/>
+              <a:t>for WIMP-nuclear scattering in a simple model</a:t>
+            </a:r>
+          </a:p>
+        </p:txBody>
+      </p:sp>
+      <p:pic>
+        <p:nvPicPr>
+          <p:cNvPr id="12" name="Picture 11">
+            <a:extLst>
+              <a:ext uri="{FF2B5EF4-FFF2-40B4-BE49-F238E27FC236}">
+                <a16:creationId xmlns:a16="http://schemas.microsoft.com/office/drawing/2014/main" id="{7412C671-7074-5E6B-5F3B-0835C51477B9}"/>
+              </a:ext>
+            </a:extLst>
+          </p:cNvPr>
+          <p:cNvPicPr>
+            <a:picLocks noChangeAspect="1"/>
+          </p:cNvPicPr>
+          <p:nvPr/>
+        </p:nvPicPr>
+        <p:blipFill>
+          <a:blip r:embed="rId7"/>
+          <a:stretch>
+            <a:fillRect/>
+          </a:stretch>
+        </p:blipFill>
+        <p:spPr>
+          <a:xfrm>
+            <a:off x="315686" y="5996205"/>
+            <a:ext cx="2110180" cy="773126"/>
+          </a:xfrm>
+          <a:prstGeom prst="rect">
+            <a:avLst/>
+          </a:prstGeom>
+        </p:spPr>
+      </p:pic>
+      <p:sp>
+        <p:nvSpPr>
+          <p:cNvPr id="13" name="TextBox 12">
+            <a:extLst>
+              <a:ext uri="{FF2B5EF4-FFF2-40B4-BE49-F238E27FC236}">
+                <a16:creationId xmlns:a16="http://schemas.microsoft.com/office/drawing/2014/main" id="{C2567E2E-559A-0DCC-8AA8-294E6CF13F18}"/>
+              </a:ext>
+            </a:extLst>
+          </p:cNvPr>
+          <p:cNvSpPr txBox="1"/>
+          <p:nvPr/>
+        </p:nvSpPr>
+        <p:spPr>
+          <a:xfrm>
+            <a:off x="209268" y="5215598"/>
+            <a:ext cx="5373651" cy="646331"/>
+          </a:xfrm>
+          <a:prstGeom prst="rect">
+            <a:avLst/>
+          </a:prstGeom>
+          <a:noFill/>
+        </p:spPr>
+        <p:txBody>
+          <a:bodyPr wrap="none" rtlCol="0">
+            <a:spAutoFit/>
+          </a:bodyPr>
+          <a:lstStyle/>
+          <a:p>
+            <a:r>
+              <a:rPr lang="en-US" dirty="0"/>
+              <a:t>From lecture 2 and the hard sphere scattering model</a:t>
+            </a:r>
+          </a:p>
+          <a:p>
+            <a:r>
+              <a:rPr lang="en-US" dirty="0"/>
+              <a:t>the maximum attainable nuclear recoil energy is</a:t>
+            </a:r>
+          </a:p>
+        </p:txBody>
+      </p:sp>
+    </p:spTree>
+    <p:extLst>
+      <p:ext uri="{BB962C8B-B14F-4D97-AF65-F5344CB8AC3E}">
+        <p14:creationId xmlns:p14="http://schemas.microsoft.com/office/powerpoint/2010/main" val="3105467777"/>
+      </p:ext>
+    </p:extLst>
+  </p:cSld>
+  <p:clrMapOvr>
+    <a:masterClrMapping/>
+  </p:clrMapOvr>
+</p:sld>
+</file>
+
+<file path=ppt/slides/slide7.xml><?xml version="1.0" encoding="utf-8"?>
+<p:sld xmlns:a="http://schemas.openxmlformats.org/drawingml/2006/main" xmlns:r="http://schemas.openxmlformats.org/officeDocument/2006/relationships" xmlns:p="http://schemas.openxmlformats.org/presentationml/2006/main">
+  <p:cSld>
+    <p:spTree>
+      <p:nvGrpSpPr>
+        <p:cNvPr id="1" name=""/>
+        <p:cNvGrpSpPr/>
+        <p:nvPr/>
+      </p:nvGrpSpPr>
+      <p:grpSpPr>
+        <a:xfrm>
+          <a:off x="0" y="0"/>
+          <a:ext cx="0" cy="0"/>
+          <a:chOff x="0" y="0"/>
+          <a:chExt cx="0" cy="0"/>
+        </a:xfrm>
+      </p:grpSpPr>
+      <p:sp>
+        <p:nvSpPr>
+          <p:cNvPr id="2" name="Title 1">
+            <a:extLst>
+              <a:ext uri="{FF2B5EF4-FFF2-40B4-BE49-F238E27FC236}">
+                <a16:creationId xmlns:a16="http://schemas.microsoft.com/office/drawing/2014/main" id="{638E76BD-F574-D175-C3A7-CBE76EBB27E2}"/>
+              </a:ext>
+            </a:extLst>
+          </p:cNvPr>
+          <p:cNvSpPr>
+            <a:spLocks noGrp="1"/>
+          </p:cNvSpPr>
+          <p:nvPr>
+            <p:ph type="title"/>
+          </p:nvPr>
+        </p:nvSpPr>
+        <p:spPr>
+          <a:xfrm>
+            <a:off x="838200" y="365125"/>
+            <a:ext cx="10515600" cy="691779"/>
+          </a:xfrm>
+        </p:spPr>
+        <p:txBody>
+          <a:bodyPr>
+            <a:normAutofit fontScale="90000"/>
+          </a:bodyPr>
+          <a:lstStyle/>
+          <a:p>
+            <a:r>
+              <a:rPr lang="en-US" dirty="0"/>
+              <a:t>Summary</a:t>
+            </a:r>
+          </a:p>
+        </p:txBody>
+      </p:sp>
+      <p:sp>
+        <p:nvSpPr>
+          <p:cNvPr id="3" name="TextBox 2">
+            <a:extLst>
+              <a:ext uri="{FF2B5EF4-FFF2-40B4-BE49-F238E27FC236}">
+                <a16:creationId xmlns:a16="http://schemas.microsoft.com/office/drawing/2014/main" id="{789A4E55-7F3E-C163-0E48-2A416344C13A}"/>
+              </a:ext>
+            </a:extLst>
+          </p:cNvPr>
+          <p:cNvSpPr txBox="1"/>
+          <p:nvPr/>
+        </p:nvSpPr>
+        <p:spPr>
+          <a:xfrm>
+            <a:off x="838200" y="998909"/>
+            <a:ext cx="10965873" cy="5632311"/>
+          </a:xfrm>
+          <a:prstGeom prst="rect">
+            <a:avLst/>
+          </a:prstGeom>
+          <a:noFill/>
+        </p:spPr>
+        <p:txBody>
+          <a:bodyPr wrap="square" rtlCol="0">
+            <a:spAutoFit/>
+          </a:bodyPr>
+          <a:lstStyle/>
+          <a:p>
+            <a:pPr marL="285750" indent="-285750">
+              <a:buFont typeface="Arial" panose="020B0604020202020204" pitchFamily="34" charset="0"/>
+              <a:buChar char="•"/>
+            </a:pPr>
+            <a:r>
+              <a:rPr lang="en-US" sz="3000" dirty="0"/>
+              <a:t>In the hard sphere scattering model, energy and momentum conservation lead to a maximum attainable recoil energy.</a:t>
+            </a:r>
+          </a:p>
+          <a:p>
+            <a:pPr marL="285750" indent="-285750">
+              <a:buFont typeface="Arial" panose="020B0604020202020204" pitchFamily="34" charset="0"/>
+              <a:buChar char="•"/>
+            </a:pPr>
+            <a:r>
+              <a:rPr lang="en-US" sz="3000" dirty="0"/>
+              <a:t>Assuming a single point of impact equally likely anywhere on the disk of impact points relative to the incoming WIMP, leads to a prediction of a uniform probability density of WIMP recoil energies up to the maximum kinematically permitted.</a:t>
+            </a:r>
+          </a:p>
+          <a:p>
+            <a:pPr marL="285750" indent="-285750">
+              <a:buFont typeface="Arial" panose="020B0604020202020204" pitchFamily="34" charset="0"/>
+              <a:buChar char="•"/>
+            </a:pPr>
+            <a:r>
+              <a:rPr lang="en-US" sz="3000" dirty="0"/>
+              <a:t>A quantum analysis contradicts this – interference predicts a form factor that is down by about a factor </a:t>
+            </a:r>
+            <a:r>
+              <a:rPr lang="en-US" sz="3000"/>
+              <a:t>of 30 </a:t>
+            </a:r>
+            <a:r>
+              <a:rPr lang="en-US" sz="3000" dirty="0"/>
+              <a:t>at the maximum recoil energy, for A=131.</a:t>
+            </a:r>
+          </a:p>
+          <a:p>
+            <a:pPr marL="285750" indent="-285750">
+              <a:buFont typeface="Arial" panose="020B0604020202020204" pitchFamily="34" charset="0"/>
+              <a:buChar char="•"/>
+            </a:pPr>
+            <a:r>
+              <a:rPr lang="en-US" sz="3000" dirty="0"/>
+              <a:t>Therefore,  to be sensitive, detectors need as low an energy threshold as possible, as event rates at low recoil energies are far more common than event rates at high recoil energies.</a:t>
+            </a:r>
+          </a:p>
+        </p:txBody>
+      </p:sp>
+    </p:spTree>
+    <p:extLst>
+      <p:ext uri="{BB962C8B-B14F-4D97-AF65-F5344CB8AC3E}">
+        <p14:creationId xmlns:p14="http://schemas.microsoft.com/office/powerpoint/2010/main" val="1736420457"/>
       </p:ext>
     </p:extLst>
   </p:cSld>

</xml_diff>